<commit_message>
update classes BookCopy, checkoutRecord, checkoutRecordEntry, libraryMember...
</commit_message>
<xml_diff>
--- a/docs/LibrarySystem - MPP.pptx
+++ b/docs/LibrarySystem - MPP.pptx
@@ -122,18 +122,6 @@
     </p:ext>
   </p:extLst>
 </p:presentation>
-</file>
-
-<file path=ppt/revisionInfo.xml><?xml version="1.0" encoding="utf-8"?>
-<p1510:revInfo xmlns:a="http://schemas.openxmlformats.org/drawingml/2006/main" xmlns:r="http://schemas.openxmlformats.org/officeDocument/2006/relationships" xmlns:p1510="http://schemas.microsoft.com/office/powerpoint/2015/10/main">
-  <p1510:revLst>
-    <p1510:client id="{28361FE8-6C3D-C93D-8CE0-731C3E7D11F5}" v="328" dt="2022-06-04T06:02:57.921"/>
-    <p1510:client id="{603E9D68-21B3-917C-E5F4-5A919F994C10}" v="97" dt="2022-06-04T05:14:11.696"/>
-    <p1510:client id="{B583DFB4-FB7D-AEC7-D35C-38EB9C224718}" v="334" vWet="335" dt="2022-06-04T13:26:09.804"/>
-    <p1510:client id="{B6378315-06F3-C2E0-14D1-2C08289C5AD1}" v="69" dt="2022-06-04T06:35:03.607"/>
-    <p1510:client id="{B6D8129E-CACF-7946-BB31-BE496EC81015}" v="126" dt="2022-06-04T13:28:28.073"/>
-  </p1510:revLst>
-</p1510:revInfo>
 </file>
 
 <file path=ppt/slideLayouts/slideLayout1.xml><?xml version="1.0" encoding="utf-8"?>
@@ -4935,10 +4923,10 @@
       </p:sp>
       <p:pic>
         <p:nvPicPr>
-          <p:cNvPr id="12" name="Picture 13" descr="Diagram&#10;&#10;Description automatically generated">
-            <a:extLst>
-              <a:ext uri="{FF2B5EF4-FFF2-40B4-BE49-F238E27FC236}">
-                <a16:creationId xmlns:a16="http://schemas.microsoft.com/office/drawing/2014/main" id="{E6153BDC-BDD0-F711-1949-CE289FE5830A}"/>
+          <p:cNvPr id="5" name="Content Placeholder 4">
+            <a:extLst>
+              <a:ext uri="{FF2B5EF4-FFF2-40B4-BE49-F238E27FC236}">
+                <a16:creationId xmlns:a16="http://schemas.microsoft.com/office/drawing/2014/main" id="{044AA8C3-744E-F47F-DEED-E1CAF8E98C60}"/>
               </a:ext>
             </a:extLst>
           </p:cNvPr>
@@ -4957,8 +4945,8 @@
         </p:blipFill>
         <p:spPr>
           <a:xfrm>
-            <a:off x="4638204" y="640080"/>
-            <a:ext cx="6486995" cy="5578816"/>
+            <a:off x="3878407" y="398156"/>
+            <a:ext cx="7950920" cy="6164690"/>
           </a:xfrm>
           <a:prstGeom prst="rect">
             <a:avLst/>
@@ -5330,19 +5318,17 @@
       </p:sp>
       <p:pic>
         <p:nvPicPr>
-          <p:cNvPr id="4" name="Content Placeholder 3">
-            <a:extLst>
-              <a:ext uri="{FF2B5EF4-FFF2-40B4-BE49-F238E27FC236}">
-                <a16:creationId xmlns:a16="http://schemas.microsoft.com/office/drawing/2014/main" id="{F5C1CAE6-9E65-A388-DE07-561E1FB4F471}"/>
+          <p:cNvPr id="12" name="Picture 11">
+            <a:extLst>
+              <a:ext uri="{FF2B5EF4-FFF2-40B4-BE49-F238E27FC236}">
+                <a16:creationId xmlns:a16="http://schemas.microsoft.com/office/drawing/2014/main" id="{8463C874-B631-8C20-5A9A-D5B8D3A4190D}"/>
               </a:ext>
             </a:extLst>
           </p:cNvPr>
           <p:cNvPicPr>
-            <a:picLocks noGrp="1" noChangeAspect="1"/>
+            <a:picLocks noChangeAspect="1"/>
           </p:cNvPicPr>
-          <p:nvPr>
-            <p:ph idx="1"/>
-          </p:nvPr>
+          <p:nvPr/>
         </p:nvPicPr>
         <p:blipFill>
           <a:blip r:embed="rId2"/>
@@ -5352,8 +5338,8 @@
         </p:blipFill>
         <p:spPr>
           <a:xfrm>
-            <a:off x="4086225" y="171162"/>
-            <a:ext cx="7650504" cy="6067592"/>
+            <a:off x="4004841" y="1157384"/>
+            <a:ext cx="8182698" cy="5700616"/>
           </a:xfrm>
           <a:prstGeom prst="rect">
             <a:avLst/>

</xml_diff>